<commit_message>
Adding testing slides to the Netwirk Seminar presentation
</commit_message>
<xml_diff>
--- a/Network Seminar/The Beacon OpenFlow Controller.pptx
+++ b/Network Seminar/The Beacon OpenFlow Controller.pptx
@@ -133,6 +133,22 @@
       </a:defRPr>
     </a:lvl9pPr>
   </p:defaultTextStyle>
+  <p:extLst>
+    <p:ext uri="{EFAFB233-063F-42B5-8137-9DF3F51BA10A}">
+      <p15:sldGuideLst xmlns:p15="http://schemas.microsoft.com/office/powerpoint/2012/main">
+        <p15:guide id="1" orient="horz" pos="2160">
+          <p15:clr>
+            <a:srgbClr val="A4A3A4"/>
+          </p15:clr>
+        </p15:guide>
+        <p15:guide id="2" pos="3840">
+          <p15:clr>
+            <a:srgbClr val="A4A3A4"/>
+          </p15:clr>
+        </p15:guide>
+      </p15:sldGuideLst>
+    </p:ext>
+  </p:extLst>
 </p:presentation>
 </file>
 
@@ -218,7 +234,7 @@
           <a:p>
             <a:fld id="{40C11690-22FC-4E03-A61D-35B3E6CF1CA1}" type="datetimeFigureOut">
               <a:rPr lang="en-US" smtClean="0"/>
-              <a:t>13/1/2016</a:t>
+              <a:t>1/16/2016</a:t>
             </a:fld>
             <a:endParaRPr lang="en-US"/>
           </a:p>
@@ -1072,7 +1088,7 @@
           <a:p>
             <a:fld id="{8B6728A6-7B9E-4263-AB05-1FFA9FAE08DC}" type="datetimeFigureOut">
               <a:rPr lang="en-US" smtClean="0"/>
-              <a:t>13/1/2016</a:t>
+              <a:t>1/16/2016</a:t>
             </a:fld>
             <a:endParaRPr lang="en-US"/>
           </a:p>
@@ -1368,7 +1384,7 @@
           <a:p>
             <a:fld id="{8B6728A6-7B9E-4263-AB05-1FFA9FAE08DC}" type="datetimeFigureOut">
               <a:rPr lang="en-US" smtClean="0"/>
-              <a:t>13/1/2016</a:t>
+              <a:t>1/16/2016</a:t>
             </a:fld>
             <a:endParaRPr lang="en-US"/>
           </a:p>
@@ -1616,7 +1632,7 @@
           <a:p>
             <a:fld id="{8B6728A6-7B9E-4263-AB05-1FFA9FAE08DC}" type="datetimeFigureOut">
               <a:rPr lang="en-US" smtClean="0"/>
-              <a:t>13/1/2016</a:t>
+              <a:t>1/16/2016</a:t>
             </a:fld>
             <a:endParaRPr lang="en-US"/>
           </a:p>
@@ -2156,7 +2172,7 @@
           <a:p>
             <a:fld id="{8B6728A6-7B9E-4263-AB05-1FFA9FAE08DC}" type="datetimeFigureOut">
               <a:rPr lang="en-US" smtClean="0"/>
-              <a:t>13/1/2016</a:t>
+              <a:t>1/16/2016</a:t>
             </a:fld>
             <a:endParaRPr lang="en-US"/>
           </a:p>
@@ -2404,7 +2420,7 @@
           <a:p>
             <a:fld id="{8B6728A6-7B9E-4263-AB05-1FFA9FAE08DC}" type="datetimeFigureOut">
               <a:rPr lang="en-US" smtClean="0"/>
-              <a:t>13/1/2016</a:t>
+              <a:t>1/16/2016</a:t>
             </a:fld>
             <a:endParaRPr lang="en-US"/>
           </a:p>
@@ -2936,7 +2952,7 @@
           <a:p>
             <a:fld id="{8B6728A6-7B9E-4263-AB05-1FFA9FAE08DC}" type="datetimeFigureOut">
               <a:rPr lang="en-US" smtClean="0"/>
-              <a:t>13/1/2016</a:t>
+              <a:t>1/16/2016</a:t>
             </a:fld>
             <a:endParaRPr lang="en-US"/>
           </a:p>
@@ -3233,7 +3249,7 @@
           <a:p>
             <a:fld id="{8B6728A6-7B9E-4263-AB05-1FFA9FAE08DC}" type="datetimeFigureOut">
               <a:rPr lang="en-US" smtClean="0"/>
-              <a:t>13/1/2016</a:t>
+              <a:t>1/16/2016</a:t>
             </a:fld>
             <a:endParaRPr lang="en-US"/>
           </a:p>
@@ -3407,7 +3423,7 @@
           <a:p>
             <a:fld id="{8B6728A6-7B9E-4263-AB05-1FFA9FAE08DC}" type="datetimeFigureOut">
               <a:rPr lang="en-US" smtClean="0"/>
-              <a:t>13/1/2016</a:t>
+              <a:t>1/16/2016</a:t>
             </a:fld>
             <a:endParaRPr lang="en-US"/>
           </a:p>
@@ -3587,7 +3603,7 @@
           <a:p>
             <a:fld id="{8B6728A6-7B9E-4263-AB05-1FFA9FAE08DC}" type="datetimeFigureOut">
               <a:rPr lang="en-US" smtClean="0"/>
-              <a:t>13/1/2016</a:t>
+              <a:t>1/16/2016</a:t>
             </a:fld>
             <a:endParaRPr lang="en-US"/>
           </a:p>
@@ -3798,7 +3814,7 @@
           <a:p>
             <a:fld id="{8B6728A6-7B9E-4263-AB05-1FFA9FAE08DC}" type="datetimeFigureOut">
               <a:rPr lang="en-US" smtClean="0"/>
-              <a:t>13/1/2016</a:t>
+              <a:t>1/16/2016</a:t>
             </a:fld>
             <a:endParaRPr lang="en-US"/>
           </a:p>
@@ -4049,7 +4065,7 @@
           <a:p>
             <a:fld id="{8B6728A6-7B9E-4263-AB05-1FFA9FAE08DC}" type="datetimeFigureOut">
               <a:rPr lang="en-US" smtClean="0"/>
-              <a:t>13/1/2016</a:t>
+              <a:t>1/16/2016</a:t>
             </a:fld>
             <a:endParaRPr lang="en-US"/>
           </a:p>
@@ -4396,7 +4412,7 @@
           <a:p>
             <a:fld id="{8B6728A6-7B9E-4263-AB05-1FFA9FAE08DC}" type="datetimeFigureOut">
               <a:rPr lang="en-US" smtClean="0"/>
-              <a:t>13/1/2016</a:t>
+              <a:t>1/16/2016</a:t>
             </a:fld>
             <a:endParaRPr lang="en-US"/>
           </a:p>
@@ -4888,7 +4904,7 @@
           <a:p>
             <a:fld id="{8B6728A6-7B9E-4263-AB05-1FFA9FAE08DC}" type="datetimeFigureOut">
               <a:rPr lang="en-US" smtClean="0"/>
-              <a:t>13/1/2016</a:t>
+              <a:t>1/16/2016</a:t>
             </a:fld>
             <a:endParaRPr lang="en-US"/>
           </a:p>
@@ -5006,7 +5022,7 @@
           <a:p>
             <a:fld id="{8B6728A6-7B9E-4263-AB05-1FFA9FAE08DC}" type="datetimeFigureOut">
               <a:rPr lang="en-US" smtClean="0"/>
-              <a:t>13/1/2016</a:t>
+              <a:t>1/16/2016</a:t>
             </a:fld>
             <a:endParaRPr lang="en-US"/>
           </a:p>
@@ -5101,7 +5117,7 @@
           <a:p>
             <a:fld id="{8B6728A6-7B9E-4263-AB05-1FFA9FAE08DC}" type="datetimeFigureOut">
               <a:rPr lang="en-US" smtClean="0"/>
-              <a:t>13/1/2016</a:t>
+              <a:t>1/16/2016</a:t>
             </a:fld>
             <a:endParaRPr lang="en-US"/>
           </a:p>
@@ -5384,7 +5400,7 @@
           <a:p>
             <a:fld id="{8B6728A6-7B9E-4263-AB05-1FFA9FAE08DC}" type="datetimeFigureOut">
               <a:rPr lang="en-US" smtClean="0"/>
-              <a:t>13/1/2016</a:t>
+              <a:t>1/16/2016</a:t>
             </a:fld>
             <a:endParaRPr lang="en-US"/>
           </a:p>
@@ -5675,7 +5691,7 @@
           <a:p>
             <a:fld id="{8B6728A6-7B9E-4263-AB05-1FFA9FAE08DC}" type="datetimeFigureOut">
               <a:rPr lang="en-US" smtClean="0"/>
-              <a:t>13/1/2016</a:t>
+              <a:t>1/16/2016</a:t>
             </a:fld>
             <a:endParaRPr lang="en-US"/>
           </a:p>
@@ -6205,7 +6221,7 @@
           <a:p>
             <a:fld id="{8B6728A6-7B9E-4263-AB05-1FFA9FAE08DC}" type="datetimeFigureOut">
               <a:rPr lang="en-US" smtClean="0"/>
-              <a:t>13/1/2016</a:t>
+              <a:t>1/16/2016</a:t>
             </a:fld>
             <a:endParaRPr lang="en-US"/>
           </a:p>
@@ -9010,11 +9026,7 @@
             </a:r>
             <a:r>
               <a:rPr lang="he-IL" dirty="0" smtClean="0"/>
-              <a:t> </a:t>
-            </a:r>
-            <a:r>
-              <a:rPr lang="he-IL" dirty="0" smtClean="0"/>
-              <a:t>מתחלקת לשתי גישות:</a:t>
+              <a:t> מתחלקת לשתי גישות:</a:t>
             </a:r>
           </a:p>
           <a:p>
@@ -9229,11 +9241,7 @@
             </a:pPr>
             <a:r>
               <a:rPr lang="he-IL" dirty="0" smtClean="0"/>
-              <a:t>תהליכוני קריאה מהתור המשותף- אחראי להוציא את ההודעות מהתור המשותף והלעביר </a:t>
-            </a:r>
-            <a:r>
-              <a:rPr lang="he-IL" dirty="0" smtClean="0"/>
-              <a:t>אותן ב</a:t>
+              <a:t>תהליכוני קריאה מהתור המשותף- אחראי להוציא את ההודעות מהתור המשותף והלעביר אותן ב</a:t>
             </a:r>
             <a:r>
               <a:rPr lang="en-US" dirty="0" smtClean="0"/>
@@ -9241,11 +9249,7 @@
             </a:r>
             <a:r>
               <a:rPr lang="he-IL" dirty="0" smtClean="0"/>
-              <a:t> </a:t>
-            </a:r>
-            <a:r>
-              <a:rPr lang="he-IL" dirty="0" smtClean="0"/>
-              <a:t>של כל אותן האפליקציות הנרשמו לקבל הודעות מסוג זה. לכל </a:t>
+              <a:t> של כל אותן האפליקציות הנרשמו לקבל הודעות מסוג זה. לכל </a:t>
             </a:r>
             <a:r>
               <a:rPr lang="en-US" dirty="0" smtClean="0"/>
@@ -9253,11 +9257,7 @@
             </a:r>
             <a:r>
               <a:rPr lang="he-IL" dirty="0" smtClean="0"/>
-              <a:t> </a:t>
-            </a:r>
-            <a:r>
-              <a:rPr lang="he-IL" dirty="0" smtClean="0"/>
-              <a:t>יהיה תהליכון כזה.</a:t>
+              <a:t> יהיה תהליכון כזה.</a:t>
             </a:r>
           </a:p>
           <a:p>
@@ -9466,11 +9466,7 @@
             <a:pPr algn="r" rtl="1"/>
             <a:r>
               <a:rPr lang="he-IL" dirty="0" smtClean="0"/>
-              <a:t>הסיטואציה הזו של מעבר ישיר מהנתב </a:t>
-            </a:r>
-            <a:r>
-              <a:rPr lang="he-IL" dirty="0" smtClean="0"/>
-              <a:t>ל</a:t>
+              <a:t>הסיטואציה הזו של מעבר ישיר מהנתב ל</a:t>
             </a:r>
             <a:r>
               <a:rPr lang="en-US" dirty="0" smtClean="0"/>
@@ -9478,15 +9474,7 @@
             </a:r>
             <a:r>
               <a:rPr lang="he-IL" dirty="0" smtClean="0"/>
-              <a:t> </a:t>
-            </a:r>
-            <a:r>
-              <a:rPr lang="he-IL" dirty="0" smtClean="0"/>
-              <a:t>יוצרת מצב בו בהכרח תהליכון אחד בלבד יהווה גורם מקשר בין </a:t>
-            </a:r>
-            <a:r>
-              <a:rPr lang="he-IL" dirty="0" smtClean="0"/>
-              <a:t>ה</a:t>
+              <a:t> יוצרת מצב בו בהכרח תהליכון אחד בלבד יהווה גורם מקשר בין ה</a:t>
             </a:r>
             <a:r>
               <a:rPr lang="en-US" dirty="0" smtClean="0"/>
@@ -9494,11 +9482,7 @@
             </a:r>
             <a:r>
               <a:rPr lang="he-IL" dirty="0" smtClean="0"/>
-              <a:t> </a:t>
-            </a:r>
-            <a:r>
-              <a:rPr lang="he-IL" dirty="0" smtClean="0"/>
-              <a:t>לנתב. ויהיה היחיד שמעביר הודעות מאותו נתב כל זמן שיש לנתב מה להעביר.</a:t>
+              <a:t> לנתב. ויהיה היחיד שמעביר הודעות מאותו נתב כל זמן שיש לנתב מה להעביר.</a:t>
             </a:r>
           </a:p>
           <a:p>
@@ -9513,11 +9497,7 @@
             </a:r>
             <a:r>
               <a:rPr lang="he-IL" dirty="0" smtClean="0"/>
-              <a:t> </a:t>
-            </a:r>
-            <a:r>
-              <a:rPr lang="he-IL" dirty="0" smtClean="0"/>
-              <a:t>המתאים, ולכן כל עוד לנתב יש הודעות להעביר התהליכון ממשיך לקחת ממנו הודעות ולהעביר הלאה.</a:t>
+              <a:t> המתאים, ולכן כל עוד לנתב יש הודעות להעביר התהליכון ממשיך לקחת ממנו הודעות ולהעביר הלאה.</a:t>
             </a:r>
           </a:p>
           <a:p>
@@ -9702,15 +9682,7 @@
             </a:r>
             <a:r>
               <a:rPr lang="he-IL" dirty="0" smtClean="0"/>
-              <a:t> שלאחר מכן תיקרא בתהליך </a:t>
-            </a:r>
-            <a:r>
-              <a:rPr lang="he-IL" dirty="0" smtClean="0"/>
-              <a:t>אותו </a:t>
-            </a:r>
-            <a:r>
-              <a:rPr lang="he-IL" dirty="0" smtClean="0"/>
-              <a:t>הצגנו קודם גם היא משפיעה על הביצוע הכללי שצריך להיות מהיר.</a:t>
+              <a:t> שלאחר מכן תיקרא בתהליך אותו הצגנו קודם גם היא משפיעה על הביצוע הכללי שצריך להיות מהיר.</a:t>
             </a:r>
           </a:p>
           <a:p>
@@ -9733,11 +9705,7 @@
             </a:r>
             <a:r>
               <a:rPr lang="he-IL" dirty="0" smtClean="0"/>
-              <a:t> ולכן הליך כתיבה יכול להתרחש "בו זמנית" במספר תהליכונים מה שעלול ליצור מצב של "מירוץ" בין תהליכונים ולכן יש צורך בסנכרון כתיבה</a:t>
-            </a:r>
-            <a:r>
-              <a:rPr lang="he-IL" dirty="0" smtClean="0"/>
-              <a:t>.</a:t>
+              <a:t> ולכן הליך כתיבה יכול להתרחש "בו זמנית" במספר תהליכונים מה שעלול ליצור מצב של "מירוץ" בין תהליכונים ולכן יש צורך בסנכרון כתיבה.</a:t>
             </a:r>
           </a:p>
           <a:p>
@@ -9968,11 +9936,7 @@
             </a:r>
             <a:r>
               <a:rPr lang="he-IL" dirty="0" smtClean="0"/>
-              <a:t> </a:t>
-            </a:r>
-            <a:r>
-              <a:rPr lang="he-IL" dirty="0" smtClean="0"/>
-              <a:t>ו</a:t>
+              <a:t> ו</a:t>
             </a:r>
             <a:r>
               <a:rPr lang="he-IL" dirty="0"/>
@@ -10005,7 +9969,6 @@
               <a:rPr lang="he-IL" dirty="0" smtClean="0"/>
               <a:t>) עד שלא תסתיים הכתיבה, מה שחוסך בהמון קריאות מיותרת ומאפשר יעילות של העבודה, וכמובן שכל מה שצריך להיכתב ייכתב.</a:t>
             </a:r>
-            <a:endParaRPr lang="he-IL" dirty="0" smtClean="0"/>
           </a:p>
         </p:txBody>
       </p:sp>
@@ -11808,7 +11771,6 @@
               <a:rPr lang="he-IL" dirty="0" smtClean="0"/>
               <a:t> מיותרות.</a:t>
             </a:r>
-            <a:endParaRPr lang="he-IL" dirty="0" smtClean="0"/>
           </a:p>
         </p:txBody>
       </p:sp>
@@ -15345,23 +15307,7 @@
                   </a:outerShdw>
                 </a:effectLst>
               </a:rPr>
-              <a:t>Throughput: single thread</a:t>
-            </a:r>
-            <a:r>
-              <a:rPr lang="en-US" sz="4000" dirty="0" smtClean="0">
-                <a:ln w="0"/>
-                <a:solidFill>
-                  <a:schemeClr val="accent1"/>
-                </a:solidFill>
-                <a:effectLst>
-                  <a:outerShdw blurRad="38100" dist="25400" dir="5400000" algn="ctr" rotWithShape="0">
-                    <a:srgbClr val="6E747A">
-                      <a:alpha val="43000"/>
-                    </a:srgbClr>
-                  </a:outerShdw>
-                </a:effectLst>
-              </a:rPr>
-              <a:t> </a:t>
+              <a:t>Throughput: single thread </a:t>
             </a:r>
             <a:endParaRPr lang="en-US" sz="4000" b="0" cap="none" spc="0" dirty="0">
               <a:ln w="0"/>
@@ -15644,7 +15590,7 @@
         </p:nvSpPr>
         <p:spPr>
           <a:xfrm>
-            <a:off x="3289594" y="496125"/>
+            <a:off x="3378195" y="124166"/>
             <a:ext cx="8422498" cy="707886"/>
           </a:xfrm>
           <a:prstGeom prst="rect">
@@ -15780,6 +15726,193 @@
           </a:extLst>
         </p:spPr>
       </p:pic>
+      <p:sp>
+        <p:nvSpPr>
+          <p:cNvPr id="5" name="TextBox 4"/>
+          <p:cNvSpPr txBox="1"/>
+          <p:nvPr/>
+        </p:nvSpPr>
+        <p:spPr>
+          <a:xfrm>
+            <a:off x="5516007" y="948690"/>
+            <a:ext cx="6284686" cy="5909310"/>
+          </a:xfrm>
+          <a:prstGeom prst="rect">
+            <a:avLst/>
+          </a:prstGeom>
+          <a:noFill/>
+        </p:spPr>
+        <p:txBody>
+          <a:bodyPr wrap="square" rtlCol="0">
+            <a:spAutoFit/>
+          </a:bodyPr>
+          <a:lstStyle/>
+          <a:p>
+            <a:pPr algn="r" rtl="1"/>
+            <a:r>
+              <a:rPr lang="he-IL" dirty="0" smtClean="0"/>
+              <a:t>במבחן זה הציר האופקי מייצג את מספר התהליכונים שבהם השתמשו, והציר האנכי מייצג את מספר הודעות ה</a:t>
+            </a:r>
+            <a:r>
+              <a:rPr lang="en-US" dirty="0" err="1" smtClean="0"/>
+              <a:t>openFlow</a:t>
+            </a:r>
+            <a:r>
+              <a:rPr lang="he-IL" dirty="0"/>
+              <a:t> </a:t>
+            </a:r>
+            <a:r>
+              <a:rPr lang="he-IL" dirty="0" smtClean="0"/>
+              <a:t>אותן שלחו (שלחו ל</a:t>
+            </a:r>
+            <a:r>
+              <a:rPr lang="en-US" dirty="0" smtClean="0"/>
+              <a:t>Beacon</a:t>
+            </a:r>
+            <a:r>
+              <a:rPr lang="he-IL" dirty="0" smtClean="0"/>
+              <a:t> והוא ענה עליהם, בשניה).</a:t>
+            </a:r>
+            <a:endParaRPr lang="he-IL" dirty="0" smtClean="0"/>
+          </a:p>
+          <a:p>
+            <a:pPr algn="r" rtl="1"/>
+            <a:r>
+              <a:rPr lang="en-US" dirty="0" smtClean="0"/>
+              <a:t>Beacon</a:t>
+            </a:r>
+            <a:r>
+              <a:rPr lang="he-IL" dirty="0" smtClean="0"/>
+              <a:t> עבד בצורה לינארית, כלומר, ככל שהעמיסו עליו יותר הודעות והתמשו בעוד תהליכונים ככה הצליח לענות על יותר הודעות. </a:t>
+            </a:r>
+            <a:r>
+              <a:rPr lang="he-IL" dirty="0"/>
+              <a:t/>
+            </a:r>
+            <a:br>
+              <a:rPr lang="he-IL" dirty="0"/>
+            </a:br>
+            <a:r>
+              <a:rPr lang="en-US" dirty="0" smtClean="0"/>
+              <a:t>NOX</a:t>
+            </a:r>
+            <a:r>
+              <a:rPr lang="he-IL" dirty="0" smtClean="0"/>
+              <a:t> עבד בצורה לינארית רק כאשר עבד בין 2 ל8 תהליכונים. אולם, עם יותר מ8 תהליכונים הביצועים שלו דעכו כיוון שהתהליך השתרע כעת על 2 מעבדים,</a:t>
+            </a:r>
+            <a:r>
+              <a:rPr lang="en-US" dirty="0" smtClean="0"/>
+              <a:t> </a:t>
+            </a:r>
+            <a:r>
+              <a:rPr lang="he-IL" dirty="0" smtClean="0"/>
+              <a:t>ותקורת הסנכרון ביניהם הייתה איטית ופגעה בביצועים. </a:t>
+            </a:r>
+          </a:p>
+          <a:p>
+            <a:pPr algn="r" rtl="1"/>
+            <a:r>
+              <a:rPr lang="he-IL" dirty="0" smtClean="0"/>
+              <a:t>כאשר משתמשים ב1-7 תהליכונים השימוש הוא ב</a:t>
+            </a:r>
+            <a:r>
+              <a:rPr lang="en-US" dirty="0" smtClean="0"/>
+              <a:t>socket</a:t>
+            </a:r>
+            <a:r>
+              <a:rPr lang="he-IL" dirty="0" smtClean="0"/>
+              <a:t> אחד, וכאשר משתמשים ביותר תהליכונים, בין 8-12</a:t>
+            </a:r>
+            <a:r>
+              <a:rPr lang="en-US" dirty="0" smtClean="0"/>
+              <a:t> </a:t>
+            </a:r>
+            <a:r>
+              <a:rPr lang="he-IL" dirty="0" smtClean="0"/>
+              <a:t>, התהליכונים הנוספים משתמשים ב</a:t>
+            </a:r>
+            <a:r>
+              <a:rPr lang="en-US" dirty="0" smtClean="0"/>
+              <a:t>socket</a:t>
+            </a:r>
+            <a:r>
+              <a:rPr lang="he-IL" dirty="0" smtClean="0"/>
+              <a:t> נוסף.</a:t>
+            </a:r>
+          </a:p>
+          <a:p>
+            <a:pPr algn="r" rtl="1"/>
+            <a:r>
+              <a:rPr lang="he-IL" dirty="0" smtClean="0"/>
+              <a:t>זו הסיבה לכך ש</a:t>
+            </a:r>
+            <a:r>
+              <a:rPr lang="en-US" dirty="0" smtClean="0"/>
+              <a:t>Master</a:t>
+            </a:r>
+            <a:r>
+              <a:rPr lang="he-IL" dirty="0" smtClean="0"/>
+              <a:t> הצליח לעלות לינארית רק עד 8.	</a:t>
+            </a:r>
+            <a:endParaRPr lang="en-US" dirty="0" smtClean="0"/>
+          </a:p>
+          <a:p>
+            <a:pPr algn="r" rtl="1"/>
+            <a:r>
+              <a:rPr lang="en-US" dirty="0" smtClean="0"/>
+              <a:t>Beacon Queue</a:t>
+            </a:r>
+            <a:r>
+              <a:rPr lang="he-IL" dirty="0" smtClean="0"/>
+              <a:t> מצריך נעילה גם ב</a:t>
+            </a:r>
+            <a:r>
+              <a:rPr lang="en-US" dirty="0" smtClean="0"/>
+              <a:t>IO threads</a:t>
+            </a:r>
+            <a:r>
+              <a:rPr lang="he-IL" dirty="0" smtClean="0"/>
+              <a:t> וגם ב</a:t>
+            </a:r>
+            <a:r>
+              <a:rPr lang="en-US" dirty="0" smtClean="0"/>
+              <a:t>pipe-line threads</a:t>
+            </a:r>
+            <a:r>
+              <a:rPr lang="he-IL" dirty="0" smtClean="0"/>
+              <a:t> ולכן הביצועים שלו לא נהיים טובים יותר עם הוספת תהליכונים.</a:t>
+            </a:r>
+          </a:p>
+          <a:p>
+            <a:pPr algn="r" rtl="1"/>
+            <a:r>
+              <a:rPr lang="en-US" dirty="0" smtClean="0"/>
+              <a:t>Beacon Immediate</a:t>
+            </a:r>
+            <a:r>
+              <a:rPr lang="he-IL" dirty="0" smtClean="0"/>
+              <a:t> מציג ביצועים מאוד נמוכים עם שימוש </a:t>
+            </a:r>
+            <a:r>
+              <a:rPr lang="he-IL" dirty="0"/>
+              <a:t>ב</a:t>
+            </a:r>
+            <a:r>
+              <a:rPr lang="he-IL" dirty="0" smtClean="0"/>
+              <a:t>מעט תהליכונים, אולם מצליח לעלות ולהפגין ביצועים טובים יותר ככל שמוסיפים עוד תהליכונים כי כאן אין את התקורה על הנעילה שמתבצעת לדוגמא ב</a:t>
+            </a:r>
+            <a:r>
+              <a:rPr lang="en-US" dirty="0" smtClean="0"/>
+              <a:t>Beacon Queue</a:t>
+            </a:r>
+            <a:r>
+              <a:rPr lang="he-IL" dirty="0" smtClean="0"/>
+              <a:t>.</a:t>
+            </a:r>
+            <a:endParaRPr lang="en-US" dirty="0"/>
+          </a:p>
+        </p:txBody>
+      </p:sp>
     </p:spTree>
     <p:extLst>
       <p:ext uri="{BB962C8B-B14F-4D97-AF65-F5344CB8AC3E}">
@@ -15902,23 +16035,7 @@
                   </a:outerShdw>
                 </a:effectLst>
               </a:rPr>
-              <a:t>Latency: single thread</a:t>
-            </a:r>
-            <a:r>
-              <a:rPr lang="en-US" sz="4000" dirty="0" smtClean="0">
-                <a:ln w="0"/>
-                <a:solidFill>
-                  <a:schemeClr val="accent1"/>
-                </a:solidFill>
-                <a:effectLst>
-                  <a:outerShdw blurRad="38100" dist="25400" dir="5400000" algn="ctr" rotWithShape="0">
-                    <a:srgbClr val="6E747A">
-                      <a:alpha val="43000"/>
-                    </a:srgbClr>
-                  </a:outerShdw>
-                </a:effectLst>
-              </a:rPr>
-              <a:t> </a:t>
+              <a:t>Latency: single thread </a:t>
             </a:r>
             <a:endParaRPr lang="en-US" sz="4000" b="0" cap="none" spc="0" dirty="0">
               <a:ln w="0"/>
@@ -15977,6 +16094,142 @@
           </a:extLst>
         </p:spPr>
       </p:pic>
+      <p:sp>
+        <p:nvSpPr>
+          <p:cNvPr id="4" name="TextBox 3"/>
+          <p:cNvSpPr txBox="1"/>
+          <p:nvPr/>
+        </p:nvSpPr>
+        <p:spPr>
+          <a:xfrm>
+            <a:off x="5651770" y="1312285"/>
+            <a:ext cx="6284686" cy="4524315"/>
+          </a:xfrm>
+          <a:prstGeom prst="rect">
+            <a:avLst/>
+          </a:prstGeom>
+          <a:noFill/>
+        </p:spPr>
+        <p:txBody>
+          <a:bodyPr wrap="square" rtlCol="0">
+            <a:spAutoFit/>
+          </a:bodyPr>
+          <a:lstStyle/>
+          <a:p>
+            <a:pPr algn="r" rtl="1"/>
+            <a:r>
+              <a:rPr lang="he-IL" dirty="0" smtClean="0"/>
+              <a:t>במבחן זה, נתב אחד שלח הודעה לקונטרולר, חיכה לתשובה, ומיד כשקיבל שלח שוב הודעה, חיכה לתשובה וכן הלאה. לאחר פרק זמן, מחלקים את הזמן שערך הניסוי למספר הפאקטות שנשלחו, ובכך מקבלים ממוצע על זמן התגיבה.</a:t>
+            </a:r>
+          </a:p>
+          <a:p>
+            <a:pPr algn="r" rtl="1"/>
+            <a:endParaRPr lang="he-IL" dirty="0"/>
+          </a:p>
+          <a:p>
+            <a:pPr algn="r" rtl="1"/>
+            <a:r>
+              <a:rPr lang="he-IL" dirty="0" smtClean="0"/>
+              <a:t>במבחן זה </a:t>
+            </a:r>
+            <a:r>
+              <a:rPr lang="en-US" dirty="0" smtClean="0"/>
+              <a:t>Beacon</a:t>
+            </a:r>
+            <a:r>
+              <a:rPr lang="he-IL" dirty="0" smtClean="0"/>
+              <a:t> קיבל את הזמן הנמוך ביותר. כלומר, הצליח לענות בממוצע על חיבלה הכי מהר מכל יתר ה</a:t>
+            </a:r>
+            <a:r>
+              <a:rPr lang="en-US" dirty="0" smtClean="0"/>
+              <a:t>Controllers</a:t>
+            </a:r>
+            <a:r>
+              <a:rPr lang="he-IL" dirty="0" smtClean="0"/>
+              <a:t> שהשתתפו בניסוי. </a:t>
+            </a:r>
+            <a:endParaRPr lang="en-US" dirty="0" smtClean="0"/>
+          </a:p>
+          <a:p>
+            <a:pPr algn="r" rtl="1"/>
+            <a:r>
+              <a:rPr lang="he-IL" dirty="0" smtClean="0"/>
+              <a:t>ניתן לראות של</a:t>
+            </a:r>
+            <a:r>
+              <a:rPr lang="en-US" dirty="0" smtClean="0"/>
+              <a:t>POX</a:t>
+            </a:r>
+            <a:r>
+              <a:rPr lang="he-IL" dirty="0" smtClean="0"/>
+              <a:t> לקח הכי הרבה זמן לענות על חבילה.</a:t>
+            </a:r>
+          </a:p>
+          <a:p>
+            <a:pPr algn="r" rtl="1"/>
+            <a:r>
+              <a:rPr lang="he-IL" dirty="0" smtClean="0"/>
+              <a:t>ההבדל ב</a:t>
+            </a:r>
+            <a:r>
+              <a:rPr lang="en-US" dirty="0" smtClean="0"/>
+              <a:t>latency</a:t>
+            </a:r>
+            <a:r>
+              <a:rPr lang="he-IL" dirty="0" smtClean="0"/>
+              <a:t> בין </a:t>
+            </a:r>
+            <a:r>
+              <a:rPr lang="en-US" dirty="0" smtClean="0"/>
+              <a:t>Beacon</a:t>
+            </a:r>
+            <a:r>
+              <a:rPr lang="he-IL" dirty="0" smtClean="0"/>
+              <a:t> ל</a:t>
+            </a:r>
+            <a:r>
+              <a:rPr lang="en-US" dirty="0" smtClean="0"/>
+              <a:t>Beacon Queue</a:t>
+            </a:r>
+            <a:r>
+              <a:rPr lang="he-IL" dirty="0" smtClean="0"/>
+              <a:t> נבע מהזמן בו התהליכונים של </a:t>
+            </a:r>
+            <a:r>
+              <a:rPr lang="en-US" dirty="0" smtClean="0"/>
+              <a:t>Beacon Queue</a:t>
+            </a:r>
+            <a:r>
+              <a:rPr lang="he-IL" dirty="0" smtClean="0"/>
+              <a:t> היו צריכים להעביר בינהם חבילות סינכרון וזה גנס עוד טיפה זמן. </a:t>
+            </a:r>
+          </a:p>
+          <a:p>
+            <a:pPr algn="r" rtl="1"/>
+            <a:endParaRPr lang="he-IL" dirty="0"/>
+          </a:p>
+          <a:p>
+            <a:pPr algn="r" rtl="1"/>
+            <a:r>
+              <a:rPr lang="en-US" dirty="0" smtClean="0"/>
+              <a:t>Beacon Immediate</a:t>
+            </a:r>
+            <a:r>
+              <a:rPr lang="he-IL" dirty="0" smtClean="0"/>
+              <a:t> הושמט מהגרף כיוון שהתנהגות הכתיבה שלו לנתבים מקבילה לזו של </a:t>
+            </a:r>
+            <a:r>
+              <a:rPr lang="en-US" dirty="0" smtClean="0"/>
+              <a:t>Beacon</a:t>
+            </a:r>
+            <a:r>
+              <a:rPr lang="he-IL" dirty="0" smtClean="0"/>
+              <a:t> ולכן כאן התוצאות שלהם מאוד דומות.</a:t>
+            </a:r>
+            <a:endParaRPr lang="en-US" dirty="0"/>
+          </a:p>
+        </p:txBody>
+      </p:sp>
     </p:spTree>
     <p:extLst>
       <p:ext uri="{BB962C8B-B14F-4D97-AF65-F5344CB8AC3E}">
@@ -16092,8 +16345,20 @@
           <a:p>
             <a:pPr algn="r" rtl="1"/>
             <a:r>
+              <a:rPr lang="en-US" sz="2400" dirty="0" smtClean="0"/>
+              <a:t>Beacon</a:t>
+            </a:r>
+            <a:r>
+              <a:rPr lang="he-IL" sz="2400" dirty="0" smtClean="0"/>
+              <a:t> </a:t>
+            </a:r>
+            <a:r>
+              <a:rPr lang="he-IL" sz="2400" dirty="0" smtClean="0"/>
+              <a:t>גילה </a:t>
+            </a:r>
+            <a:r>
               <a:rPr lang="he-IL" sz="2400" dirty="0"/>
-              <a:t>ביקון גילה איזורים חדשים בעיצוב של קונטרולרים של </a:t>
+              <a:t>איזורים חדשים בעיצוב של קונטרולרים של </a:t>
             </a:r>
             <a:r>
               <a:rPr lang="en-US" sz="2400" dirty="0" err="1" smtClean="0"/>
@@ -17032,11 +17297,7 @@
             </a:r>
             <a:r>
               <a:rPr lang="he-IL" dirty="0" smtClean="0"/>
-              <a:t> </a:t>
-            </a:r>
-            <a:r>
-              <a:rPr lang="he-IL" dirty="0" smtClean="0"/>
-              <a:t>הראשונה של </a:t>
+              <a:t> הראשונה של </a:t>
             </a:r>
             <a:r>
               <a:rPr lang="en-US" dirty="0" smtClean="0"/>
@@ -17689,11 +17950,7 @@
             <a:pPr algn="r" rtl="1"/>
             <a:r>
               <a:rPr lang="he-IL" dirty="0" smtClean="0"/>
-              <a:t>יכולת ניהול הזכרון האוטומטי תרום לעבודה עם שגיאות זכרון מעטות. שפות אלו לרוב גם בעלות זמן קומפילציה קצר יותר ויכולת הכוונה מדויקת לטעויות עד רמת השורה בה נעשתה הטעות</a:t>
-            </a:r>
-            <a:r>
-              <a:rPr lang="he-IL" dirty="0" smtClean="0"/>
-              <a:t>.</a:t>
+              <a:t>יכולת ניהול הזכרון האוטומטי תרום לעבודה עם שגיאות זכרון מעטות. שפות אלו לרוב גם בעלות זמן קומפילציה קצר יותר ויכולת הכוונה מדויקת לטעויות עד רמת השורה בה נעשתה הטעות.</a:t>
             </a:r>
             <a:endParaRPr lang="he-IL" dirty="0"/>
           </a:p>
@@ -18650,11 +18907,7 @@
             <a:pPr algn="r" rtl="1"/>
             <a:r>
               <a:rPr lang="he-IL" dirty="0" smtClean="0"/>
-              <a:t>גמישות </a:t>
-            </a:r>
-            <a:r>
-              <a:rPr lang="he-IL" dirty="0" smtClean="0"/>
-              <a:t>במערכת הפעלה היא מצרך חובה בכל מה שקשור בפיתוח </a:t>
+              <a:t>גמישות במערכת הפעלה היא מצרך חובה בכל מה שקשור בפיתוח </a:t>
             </a:r>
             <a:r>
               <a:rPr lang="en-US" dirty="0" smtClean="0"/>
@@ -18740,11 +18993,7 @@
             <a:pPr algn="r" rtl="1"/>
             <a:r>
               <a:rPr lang="he-IL" dirty="0" smtClean="0"/>
-              <a:t>איכות ביצוע היא עניין שנבחן ספציפית למקרה שבו </a:t>
-            </a:r>
-            <a:r>
-              <a:rPr lang="he-IL" dirty="0" smtClean="0"/>
-              <a:t>מתעסקים.</a:t>
+              <a:t>איכות ביצוע היא עניין שנבחן ספציפית למקרה שבו מתעסקים.</a:t>
             </a:r>
             <a:r>
               <a:rPr lang="en-US" dirty="0" smtClean="0"/>
@@ -18752,11 +19001,7 @@
             </a:r>
             <a:r>
               <a:rPr lang="he-IL" dirty="0" smtClean="0"/>
-              <a:t>בכל </a:t>
-            </a:r>
-            <a:r>
-              <a:rPr lang="he-IL" dirty="0" smtClean="0"/>
-              <a:t>מה שקשור לפיתוח </a:t>
+              <a:t>בכל מה שקשור לפיתוח </a:t>
             </a:r>
             <a:r>
               <a:rPr lang="en-US" dirty="0" err="1" smtClean="0"/>
@@ -20382,7 +20627,7 @@
   <a:extraClrSchemeLst/>
   <a:extLst>
     <a:ext uri="{05A4C25C-085E-4340-85A3-A5531E510DB2}">
-      <thm15:themeFamily xmlns="" xmlns:thm15="http://schemas.microsoft.com/office/thememl/2012/main" name="Parallax" id="{3388167B-A2EB-4685-9635-1831D9AEF8C4}" vid="{EBEC8F79-A447-43FC-8E81-85E8468AF3F9}"/>
+      <thm15:themeFamily xmlns:thm15="http://schemas.microsoft.com/office/thememl/2012/main" name="Parallax" id="{3388167B-A2EB-4685-9635-1831D9AEF8C4}" vid="{EBEC8F79-A447-43FC-8E81-85E8468AF3F9}"/>
     </a:ext>
   </a:extLst>
 </a:theme>

</xml_diff>

<commit_message>
Adding the Current location to Android ex3
</commit_message>
<xml_diff>
--- a/Network Seminar/The Beacon OpenFlow Controller.pptx
+++ b/Network Seminar/The Beacon OpenFlow Controller.pptx
@@ -15773,7 +15773,6 @@
               <a:rPr lang="he-IL" dirty="0" smtClean="0"/>
               <a:t> והוא ענה עליהם, בשניה).</a:t>
             </a:r>
-            <a:endParaRPr lang="he-IL" dirty="0" smtClean="0"/>
           </a:p>
           <a:p>
             <a:pPr algn="r" rtl="1"/>
@@ -16350,11 +16349,7 @@
             </a:r>
             <a:r>
               <a:rPr lang="he-IL" sz="2400" dirty="0" smtClean="0"/>
-              <a:t> </a:t>
-            </a:r>
-            <a:r>
-              <a:rPr lang="he-IL" sz="2400" dirty="0" smtClean="0"/>
-              <a:t>גילה </a:t>
+              <a:t> גילה </a:t>
             </a:r>
             <a:r>
               <a:rPr lang="he-IL" sz="2400" dirty="0"/>

</xml_diff>